<commit_message>
upload final version of slides and results
</commit_message>
<xml_diff>
--- a/final-presentation/Group_8__Results_Presentation.pptx
+++ b/final-presentation/Group_8__Results_Presentation.pptx
@@ -276,7 +276,7 @@
           <a:p>
             <a:fld id="{7765D6CD-4961-4EE6-84DD-5B3C33F6D660}" type="datetimeFigureOut">
               <a:rPr lang="en-US" smtClean="0"/>
-              <a:t>12/1/2020</a:t>
+              <a:t>12/6/2020</a:t>
             </a:fld>
             <a:endParaRPr lang="en-US" dirty="0"/>
           </a:p>
@@ -474,7 +474,7 @@
           <a:p>
             <a:fld id="{7765D6CD-4961-4EE6-84DD-5B3C33F6D660}" type="datetimeFigureOut">
               <a:rPr lang="en-US" smtClean="0"/>
-              <a:t>12/1/2020</a:t>
+              <a:t>12/6/2020</a:t>
             </a:fld>
             <a:endParaRPr lang="en-US" dirty="0"/>
           </a:p>
@@ -682,7 +682,7 @@
           <a:p>
             <a:fld id="{7765D6CD-4961-4EE6-84DD-5B3C33F6D660}" type="datetimeFigureOut">
               <a:rPr lang="en-US" smtClean="0"/>
-              <a:t>12/1/2020</a:t>
+              <a:t>12/6/2020</a:t>
             </a:fld>
             <a:endParaRPr lang="en-US" dirty="0"/>
           </a:p>
@@ -880,7 +880,7 @@
           <a:p>
             <a:fld id="{7765D6CD-4961-4EE6-84DD-5B3C33F6D660}" type="datetimeFigureOut">
               <a:rPr lang="en-US" smtClean="0"/>
-              <a:t>12/1/2020</a:t>
+              <a:t>12/6/2020</a:t>
             </a:fld>
             <a:endParaRPr lang="en-US" dirty="0"/>
           </a:p>
@@ -1155,7 +1155,7 @@
           <a:p>
             <a:fld id="{7765D6CD-4961-4EE6-84DD-5B3C33F6D660}" type="datetimeFigureOut">
               <a:rPr lang="en-US" smtClean="0"/>
-              <a:t>12/1/2020</a:t>
+              <a:t>12/6/2020</a:t>
             </a:fld>
             <a:endParaRPr lang="en-US" dirty="0"/>
           </a:p>
@@ -1420,7 +1420,7 @@
           <a:p>
             <a:fld id="{7765D6CD-4961-4EE6-84DD-5B3C33F6D660}" type="datetimeFigureOut">
               <a:rPr lang="en-US" smtClean="0"/>
-              <a:t>12/1/2020</a:t>
+              <a:t>12/6/2020</a:t>
             </a:fld>
             <a:endParaRPr lang="en-US" dirty="0"/>
           </a:p>
@@ -1832,7 +1832,7 @@
           <a:p>
             <a:fld id="{7765D6CD-4961-4EE6-84DD-5B3C33F6D660}" type="datetimeFigureOut">
               <a:rPr lang="en-US" smtClean="0"/>
-              <a:t>12/1/2020</a:t>
+              <a:t>12/6/2020</a:t>
             </a:fld>
             <a:endParaRPr lang="en-US" dirty="0"/>
           </a:p>
@@ -1973,7 +1973,7 @@
           <a:p>
             <a:fld id="{7765D6CD-4961-4EE6-84DD-5B3C33F6D660}" type="datetimeFigureOut">
               <a:rPr lang="en-US" smtClean="0"/>
-              <a:t>12/1/2020</a:t>
+              <a:t>12/6/2020</a:t>
             </a:fld>
             <a:endParaRPr lang="en-US" dirty="0"/>
           </a:p>
@@ -2086,7 +2086,7 @@
           <a:p>
             <a:fld id="{7765D6CD-4961-4EE6-84DD-5B3C33F6D660}" type="datetimeFigureOut">
               <a:rPr lang="en-US" smtClean="0"/>
-              <a:t>12/1/2020</a:t>
+              <a:t>12/6/2020</a:t>
             </a:fld>
             <a:endParaRPr lang="en-US" dirty="0"/>
           </a:p>
@@ -2397,7 +2397,7 @@
           <a:p>
             <a:fld id="{7765D6CD-4961-4EE6-84DD-5B3C33F6D660}" type="datetimeFigureOut">
               <a:rPr lang="en-US" smtClean="0"/>
-              <a:t>12/1/2020</a:t>
+              <a:t>12/6/2020</a:t>
             </a:fld>
             <a:endParaRPr lang="en-US" dirty="0"/>
           </a:p>
@@ -2685,7 +2685,7 @@
           <a:p>
             <a:fld id="{7765D6CD-4961-4EE6-84DD-5B3C33F6D660}" type="datetimeFigureOut">
               <a:rPr lang="en-US" smtClean="0"/>
-              <a:t>12/1/2020</a:t>
+              <a:t>12/6/2020</a:t>
             </a:fld>
             <a:endParaRPr lang="en-US" dirty="0"/>
           </a:p>
@@ -2926,7 +2926,7 @@
           <a:p>
             <a:fld id="{7765D6CD-4961-4EE6-84DD-5B3C33F6D660}" type="datetimeFigureOut">
               <a:rPr lang="en-US" smtClean="0"/>
-              <a:t>12/1/2020</a:t>
+              <a:t>12/6/2020</a:t>
             </a:fld>
             <a:endParaRPr lang="en-US" dirty="0"/>
           </a:p>
@@ -13544,7 +13544,7 @@
         <p:spPr bwMode="auto">
           <a:xfrm>
             <a:off x="0" y="1451998"/>
-            <a:ext cx="2812869" cy="364246"/>
+            <a:ext cx="3115159" cy="364246"/>
           </a:xfrm>
           <a:prstGeom prst="rect">
             <a:avLst/>
@@ -13574,7 +13574,7 @@
                 <a:cs typeface="Segoe UI" panose="020B0502040204020203" pitchFamily="34" charset="0"/>
                 <a:sym typeface="Symbol" pitchFamily="18" charset="2"/>
               </a:rPr>
-              <a:t>Extending the Botnet</a:t>
+              <a:t>Removing the Infection</a:t>
             </a:r>
           </a:p>
         </p:txBody>

</xml_diff>